<commit_message>
Fix an issue with the graph
</commit_message>
<xml_diff>
--- a/Lab05_Billings/State_Graph_Billings.pptx
+++ b/Lab05_Billings/State_Graph_Billings.pptx
@@ -104,6 +104,11 @@
       </a:defRPr>
     </a:lvl9pPr>
   </p:defaultTextStyle>
+  <p:extLst>
+    <p:ext uri="{EFAFB233-063F-42B5-8137-9DF3F51BA10A}">
+      <p15:sldGuideLst xmlns:p15="http://schemas.microsoft.com/office/powerpoint/2012/main"/>
+    </p:ext>
+  </p:extLst>
 </p:presentation>
 </file>
 
@@ -2966,15 +2971,15 @@
       </p:grpSpPr>
       <p:grpSp>
         <p:nvGrpSpPr>
-          <p:cNvPr id="107" name="Group 106"/>
+          <p:cNvPr id="46" name="Group 45"/>
           <p:cNvGrpSpPr/>
           <p:nvPr/>
         </p:nvGrpSpPr>
         <p:grpSpPr>
           <a:xfrm>
-            <a:off x="1030778" y="498763"/>
+            <a:off x="1049984" y="573261"/>
             <a:ext cx="10066713" cy="5835535"/>
-            <a:chOff x="1030778" y="498763"/>
+            <a:chOff x="916634" y="268461"/>
             <a:chExt cx="10066713" cy="5835535"/>
           </a:xfrm>
         </p:grpSpPr>
@@ -2986,7 +2991,7 @@
           </p:nvSpPr>
           <p:spPr>
             <a:xfrm>
-              <a:off x="1030778" y="498763"/>
+              <a:off x="916634" y="268461"/>
               <a:ext cx="10066713" cy="5835535"/>
             </a:xfrm>
             <a:prstGeom prst="rect">
@@ -3021,699 +3026,1465 @@
             </a:p>
           </p:txBody>
         </p:sp>
-        <p:grpSp>
-          <p:nvGrpSpPr>
-            <p:cNvPr id="105" name="Group 104"/>
-            <p:cNvGrpSpPr/>
+        <p:sp>
+          <p:nvSpPr>
+            <p:cNvPr id="4" name="Oval 3"/>
+            <p:cNvSpPr/>
             <p:nvPr/>
-          </p:nvGrpSpPr>
-          <p:grpSpPr>
+          </p:nvSpPr>
+          <p:spPr>
             <a:xfrm>
-              <a:off x="1600470" y="1194949"/>
-              <a:ext cx="8927327" cy="4443161"/>
-              <a:chOff x="1612339" y="1123451"/>
-              <a:chExt cx="8927327" cy="4443161"/>
+              <a:off x="1139024" y="1194949"/>
+              <a:ext cx="1604210" cy="1604210"/>
             </a:xfrm>
-          </p:grpSpPr>
-          <p:sp>
-            <p:nvSpPr>
-              <p:cNvPr id="4" name="Oval 3"/>
-              <p:cNvSpPr/>
-              <p:nvPr/>
-            </p:nvSpPr>
-            <p:spPr>
-              <a:xfrm>
-                <a:off x="1612339" y="1123451"/>
-                <a:ext cx="1604210" cy="1604210"/>
-              </a:xfrm>
-              <a:prstGeom prst="ellipse">
-                <a:avLst/>
-              </a:prstGeom>
-              <a:ln>
-                <a:solidFill>
-                  <a:schemeClr val="tx1"/>
-                </a:solidFill>
-              </a:ln>
-            </p:spPr>
-            <p:style>
-              <a:lnRef idx="2">
-                <a:schemeClr val="accent6"/>
-              </a:lnRef>
-              <a:fillRef idx="1">
-                <a:schemeClr val="lt1"/>
-              </a:fillRef>
-              <a:effectRef idx="0">
-                <a:schemeClr val="accent6"/>
-              </a:effectRef>
-              <a:fontRef idx="minor">
-                <a:schemeClr val="dk1"/>
-              </a:fontRef>
-            </p:style>
-            <p:txBody>
-              <a:bodyPr rtlCol="0" anchor="ctr"/>
-              <a:lstStyle/>
-              <a:p>
-                <a:pPr algn="ctr"/>
-                <a:r>
-                  <a:rPr lang="en-US" dirty="0" smtClean="0"/>
-                  <a:t>000</a:t>
-                </a:r>
-                <a:endParaRPr lang="en-US" dirty="0"/>
-              </a:p>
-            </p:txBody>
-          </p:sp>
-          <p:sp>
-            <p:nvSpPr>
-              <p:cNvPr id="5" name="Oval 4"/>
-              <p:cNvSpPr/>
-              <p:nvPr/>
-            </p:nvSpPr>
-            <p:spPr>
-              <a:xfrm>
-                <a:off x="8935456" y="3962402"/>
-                <a:ext cx="1604210" cy="1604210"/>
-              </a:xfrm>
-              <a:prstGeom prst="ellipse">
-                <a:avLst/>
-              </a:prstGeom>
-              <a:ln>
-                <a:solidFill>
-                  <a:schemeClr val="tx1"/>
-                </a:solidFill>
-              </a:ln>
-            </p:spPr>
-            <p:style>
-              <a:lnRef idx="2">
-                <a:schemeClr val="accent6"/>
-              </a:lnRef>
-              <a:fillRef idx="1">
-                <a:schemeClr val="lt1"/>
-              </a:fillRef>
-              <a:effectRef idx="0">
-                <a:schemeClr val="accent6"/>
-              </a:effectRef>
-              <a:fontRef idx="minor">
-                <a:schemeClr val="dk1"/>
-              </a:fontRef>
-            </p:style>
-            <p:txBody>
-              <a:bodyPr rtlCol="0" anchor="ctr"/>
-              <a:lstStyle/>
-              <a:p>
-                <a:pPr algn="ctr"/>
-                <a:r>
-                  <a:rPr lang="en-US" dirty="0" smtClean="0"/>
-                  <a:t>001</a:t>
-                </a:r>
-                <a:endParaRPr lang="en-US" dirty="0"/>
-              </a:p>
-            </p:txBody>
-          </p:sp>
-          <p:sp>
-            <p:nvSpPr>
-              <p:cNvPr id="6" name="Oval 5"/>
-              <p:cNvSpPr/>
-              <p:nvPr/>
-            </p:nvSpPr>
-            <p:spPr>
-              <a:xfrm>
-                <a:off x="8935456" y="1123451"/>
-                <a:ext cx="1604210" cy="1604210"/>
-              </a:xfrm>
-              <a:prstGeom prst="ellipse">
-                <a:avLst/>
-              </a:prstGeom>
-              <a:ln>
-                <a:solidFill>
-                  <a:schemeClr val="tx1"/>
-                </a:solidFill>
-              </a:ln>
-            </p:spPr>
-            <p:style>
-              <a:lnRef idx="2">
-                <a:schemeClr val="accent6"/>
-              </a:lnRef>
-              <a:fillRef idx="1">
-                <a:schemeClr val="lt1"/>
-              </a:fillRef>
-              <a:effectRef idx="0">
-                <a:schemeClr val="accent6"/>
-              </a:effectRef>
-              <a:fontRef idx="minor">
-                <a:schemeClr val="dk1"/>
-              </a:fontRef>
-            </p:style>
-            <p:txBody>
-              <a:bodyPr rtlCol="0" anchor="ctr"/>
-              <a:lstStyle/>
-              <a:p>
-                <a:pPr algn="ctr"/>
-                <a:r>
-                  <a:rPr lang="en-US" dirty="0" smtClean="0"/>
-                  <a:t>010</a:t>
-                </a:r>
-                <a:endParaRPr lang="en-US" dirty="0"/>
-              </a:p>
-            </p:txBody>
-          </p:sp>
-          <p:sp>
-            <p:nvSpPr>
-              <p:cNvPr id="7" name="Oval 6"/>
-              <p:cNvSpPr/>
-              <p:nvPr/>
-            </p:nvSpPr>
-            <p:spPr>
-              <a:xfrm>
-                <a:off x="6418322" y="3962402"/>
-                <a:ext cx="1604210" cy="1604210"/>
-              </a:xfrm>
-              <a:prstGeom prst="ellipse">
-                <a:avLst/>
-              </a:prstGeom>
-              <a:ln>
-                <a:solidFill>
-                  <a:schemeClr val="tx1"/>
-                </a:solidFill>
-              </a:ln>
-            </p:spPr>
-            <p:style>
-              <a:lnRef idx="2">
-                <a:schemeClr val="accent6"/>
-              </a:lnRef>
-              <a:fillRef idx="1">
-                <a:schemeClr val="lt1"/>
-              </a:fillRef>
-              <a:effectRef idx="0">
-                <a:schemeClr val="accent6"/>
-              </a:effectRef>
-              <a:fontRef idx="minor">
-                <a:schemeClr val="dk1"/>
-              </a:fontRef>
-            </p:style>
-            <p:txBody>
-              <a:bodyPr rtlCol="0" anchor="ctr"/>
-              <a:lstStyle/>
-              <a:p>
-                <a:pPr algn="ctr"/>
-                <a:r>
-                  <a:rPr lang="en-US" dirty="0" smtClean="0"/>
-                  <a:t>011</a:t>
-                </a:r>
-                <a:endParaRPr lang="en-US" dirty="0"/>
-              </a:p>
-            </p:txBody>
-          </p:sp>
-          <p:sp>
-            <p:nvSpPr>
-              <p:cNvPr id="8" name="Oval 7"/>
-              <p:cNvSpPr/>
-              <p:nvPr/>
-            </p:nvSpPr>
-            <p:spPr>
-              <a:xfrm>
-                <a:off x="1612339" y="3962402"/>
-                <a:ext cx="1604210" cy="1604210"/>
-              </a:xfrm>
-              <a:prstGeom prst="ellipse">
-                <a:avLst/>
-              </a:prstGeom>
-              <a:ln>
-                <a:solidFill>
-                  <a:schemeClr val="tx1"/>
-                </a:solidFill>
-              </a:ln>
-            </p:spPr>
-            <p:style>
-              <a:lnRef idx="2">
-                <a:schemeClr val="accent6"/>
-              </a:lnRef>
-              <a:fillRef idx="1">
-                <a:schemeClr val="lt1"/>
-              </a:fillRef>
-              <a:effectRef idx="0">
-                <a:schemeClr val="accent6"/>
-              </a:effectRef>
-              <a:fontRef idx="minor">
-                <a:schemeClr val="dk1"/>
-              </a:fontRef>
-            </p:style>
-            <p:txBody>
-              <a:bodyPr rtlCol="0" anchor="ctr"/>
-              <a:lstStyle/>
-              <a:p>
-                <a:pPr algn="ctr"/>
-                <a:r>
-                  <a:rPr lang="en-US" dirty="0"/>
-                  <a:t>1</a:t>
-                </a:r>
-                <a:r>
-                  <a:rPr lang="en-US" dirty="0" smtClean="0"/>
-                  <a:t>00</a:t>
-                </a:r>
-                <a:endParaRPr lang="en-US" dirty="0"/>
-              </a:p>
-            </p:txBody>
-          </p:sp>
-          <p:sp>
-            <p:nvSpPr>
-              <p:cNvPr id="9" name="Oval 8"/>
-              <p:cNvSpPr/>
-              <p:nvPr/>
-            </p:nvSpPr>
-            <p:spPr>
-              <a:xfrm>
-                <a:off x="3901188" y="3962402"/>
-                <a:ext cx="1604210" cy="1604210"/>
-              </a:xfrm>
-              <a:prstGeom prst="ellipse">
-                <a:avLst/>
-              </a:prstGeom>
-              <a:ln>
-                <a:solidFill>
-                  <a:schemeClr val="tx1"/>
-                </a:solidFill>
-              </a:ln>
-            </p:spPr>
-            <p:style>
-              <a:lnRef idx="2">
-                <a:schemeClr val="accent6"/>
-              </a:lnRef>
-              <a:fillRef idx="1">
-                <a:schemeClr val="lt1"/>
-              </a:fillRef>
-              <a:effectRef idx="0">
-                <a:schemeClr val="accent6"/>
-              </a:effectRef>
-              <a:fontRef idx="minor">
-                <a:schemeClr val="dk1"/>
-              </a:fontRef>
-            </p:style>
-            <p:txBody>
-              <a:bodyPr rtlCol="0" anchor="ctr"/>
-              <a:lstStyle/>
-              <a:p>
-                <a:pPr algn="ctr"/>
-                <a:r>
-                  <a:rPr lang="en-US" dirty="0"/>
-                  <a:t>1</a:t>
-                </a:r>
-                <a:r>
-                  <a:rPr lang="en-US" dirty="0" smtClean="0"/>
-                  <a:t>01</a:t>
-                </a:r>
-                <a:endParaRPr lang="en-US" dirty="0"/>
-              </a:p>
-            </p:txBody>
-          </p:sp>
-          <p:sp>
-            <p:nvSpPr>
-              <p:cNvPr id="10" name="Oval 9"/>
-              <p:cNvSpPr/>
-              <p:nvPr/>
-            </p:nvSpPr>
-            <p:spPr>
-              <a:xfrm>
-                <a:off x="6300856" y="1123451"/>
-                <a:ext cx="1604210" cy="1604210"/>
-              </a:xfrm>
-              <a:prstGeom prst="ellipse">
-                <a:avLst/>
-              </a:prstGeom>
-              <a:ln>
-                <a:solidFill>
-                  <a:schemeClr val="tx1"/>
-                </a:solidFill>
-              </a:ln>
-            </p:spPr>
-            <p:style>
-              <a:lnRef idx="2">
-                <a:schemeClr val="accent6"/>
-              </a:lnRef>
-              <a:fillRef idx="1">
-                <a:schemeClr val="lt1"/>
-              </a:fillRef>
-              <a:effectRef idx="0">
-                <a:schemeClr val="accent6"/>
-              </a:effectRef>
-              <a:fontRef idx="minor">
-                <a:schemeClr val="dk1"/>
-              </a:fontRef>
-            </p:style>
-            <p:txBody>
-              <a:bodyPr rtlCol="0" anchor="ctr"/>
-              <a:lstStyle/>
-              <a:p>
-                <a:pPr algn="ctr"/>
-                <a:r>
-                  <a:rPr lang="en-US" dirty="0"/>
-                  <a:t>1</a:t>
-                </a:r>
-                <a:r>
-                  <a:rPr lang="en-US" dirty="0" smtClean="0"/>
-                  <a:t>10</a:t>
-                </a:r>
-                <a:endParaRPr lang="en-US" dirty="0"/>
-              </a:p>
-            </p:txBody>
-          </p:sp>
-          <p:sp>
-            <p:nvSpPr>
-              <p:cNvPr id="11" name="Oval 10"/>
-              <p:cNvSpPr/>
-              <p:nvPr/>
-            </p:nvSpPr>
-            <p:spPr>
-              <a:xfrm>
-                <a:off x="3780399" y="1123451"/>
-                <a:ext cx="1604210" cy="1604210"/>
-              </a:xfrm>
-              <a:prstGeom prst="ellipse">
-                <a:avLst/>
-              </a:prstGeom>
-              <a:ln>
-                <a:solidFill>
-                  <a:schemeClr val="tx1"/>
-                </a:solidFill>
-              </a:ln>
-            </p:spPr>
-            <p:style>
-              <a:lnRef idx="2">
-                <a:schemeClr val="accent6"/>
-              </a:lnRef>
-              <a:fillRef idx="1">
-                <a:schemeClr val="lt1"/>
-              </a:fillRef>
-              <a:effectRef idx="0">
-                <a:schemeClr val="accent6"/>
-              </a:effectRef>
-              <a:fontRef idx="minor">
-                <a:schemeClr val="dk1"/>
-              </a:fontRef>
-            </p:style>
-            <p:txBody>
-              <a:bodyPr rtlCol="0" anchor="ctr"/>
-              <a:lstStyle/>
-              <a:p>
-                <a:pPr algn="ctr"/>
-                <a:r>
-                  <a:rPr lang="en-US" dirty="0"/>
-                  <a:t>1</a:t>
-                </a:r>
-                <a:r>
-                  <a:rPr lang="en-US" dirty="0" smtClean="0"/>
-                  <a:t>11</a:t>
-                </a:r>
-                <a:endParaRPr lang="en-US" dirty="0"/>
-              </a:p>
-            </p:txBody>
-          </p:sp>
-          <p:cxnSp>
-            <p:nvCxnSpPr>
-              <p:cNvPr id="13" name="Straight Arrow Connector 12"/>
-              <p:cNvCxnSpPr>
-                <a:stCxn id="4" idx="4"/>
-                <a:endCxn id="8" idx="0"/>
-              </p:cNvCxnSpPr>
-              <p:nvPr/>
-            </p:nvCxnSpPr>
-            <p:spPr>
-              <a:xfrm>
-                <a:off x="2414444" y="2727661"/>
-                <a:ext cx="0" cy="1234741"/>
-              </a:xfrm>
-              <a:prstGeom prst="straightConnector1">
-                <a:avLst/>
-              </a:prstGeom>
-              <a:ln>
-                <a:tailEnd type="triangle"/>
-              </a:ln>
-            </p:spPr>
-            <p:style>
-              <a:lnRef idx="3">
-                <a:schemeClr val="dk1"/>
-              </a:lnRef>
-              <a:fillRef idx="0">
-                <a:schemeClr val="dk1"/>
-              </a:fillRef>
-              <a:effectRef idx="2">
-                <a:schemeClr val="dk1"/>
-              </a:effectRef>
-              <a:fontRef idx="minor">
+            <a:prstGeom prst="ellipse">
+              <a:avLst/>
+            </a:prstGeom>
+            <a:ln>
+              <a:solidFill>
                 <a:schemeClr val="tx1"/>
-              </a:fontRef>
-            </p:style>
-          </p:cxnSp>
-          <p:cxnSp>
-            <p:nvCxnSpPr>
-              <p:cNvPr id="15" name="Straight Arrow Connector 14"/>
-              <p:cNvCxnSpPr>
-                <a:stCxn id="5" idx="0"/>
-                <a:endCxn id="6" idx="4"/>
-              </p:cNvCxnSpPr>
-              <p:nvPr/>
-            </p:nvCxnSpPr>
-            <p:spPr>
-              <a:xfrm flipV="1">
-                <a:off x="9737561" y="2727661"/>
-                <a:ext cx="0" cy="1234741"/>
-              </a:xfrm>
-              <a:prstGeom prst="straightConnector1">
-                <a:avLst/>
-              </a:prstGeom>
-              <a:ln>
-                <a:tailEnd type="triangle"/>
-              </a:ln>
-            </p:spPr>
-            <p:style>
-              <a:lnRef idx="3">
-                <a:schemeClr val="dk1"/>
-              </a:lnRef>
-              <a:fillRef idx="0">
-                <a:schemeClr val="dk1"/>
-              </a:fillRef>
-              <a:effectRef idx="2">
-                <a:schemeClr val="dk1"/>
-              </a:effectRef>
-              <a:fontRef idx="minor">
+              </a:solidFill>
+            </a:ln>
+          </p:spPr>
+          <p:style>
+            <a:lnRef idx="2">
+              <a:schemeClr val="accent6"/>
+            </a:lnRef>
+            <a:fillRef idx="1">
+              <a:schemeClr val="lt1"/>
+            </a:fillRef>
+            <a:effectRef idx="0">
+              <a:schemeClr val="accent6"/>
+            </a:effectRef>
+            <a:fontRef idx="minor">
+              <a:schemeClr val="dk1"/>
+            </a:fontRef>
+          </p:style>
+          <p:txBody>
+            <a:bodyPr rtlCol="0" anchor="ctr"/>
+            <a:lstStyle/>
+            <a:p>
+              <a:pPr algn="ctr"/>
+              <a:r>
+                <a:rPr lang="en-US" dirty="0" smtClean="0"/>
+                <a:t>000</a:t>
+              </a:r>
+              <a:endParaRPr lang="en-US" dirty="0"/>
+            </a:p>
+          </p:txBody>
+        </p:sp>
+        <p:sp>
+          <p:nvSpPr>
+            <p:cNvPr id="5" name="Oval 4"/>
+            <p:cNvSpPr/>
+            <p:nvPr/>
+          </p:nvSpPr>
+          <p:spPr>
+            <a:xfrm>
+              <a:off x="8923587" y="4033900"/>
+              <a:ext cx="1604210" cy="1604210"/>
+            </a:xfrm>
+            <a:prstGeom prst="ellipse">
+              <a:avLst/>
+            </a:prstGeom>
+            <a:ln>
+              <a:solidFill>
                 <a:schemeClr val="tx1"/>
-              </a:fontRef>
-            </p:style>
-          </p:cxnSp>
-          <p:cxnSp>
-            <p:nvCxnSpPr>
-              <p:cNvPr id="17" name="Straight Arrow Connector 16"/>
-              <p:cNvCxnSpPr>
-                <a:stCxn id="6" idx="2"/>
-                <a:endCxn id="10" idx="6"/>
-              </p:cNvCxnSpPr>
-              <p:nvPr/>
-            </p:nvCxnSpPr>
-            <p:spPr>
-              <a:xfrm flipH="1">
-                <a:off x="7905066" y="1925556"/>
-                <a:ext cx="1030390" cy="0"/>
-              </a:xfrm>
-              <a:prstGeom prst="straightConnector1">
-                <a:avLst/>
-              </a:prstGeom>
-              <a:ln>
-                <a:tailEnd type="triangle"/>
-              </a:ln>
-            </p:spPr>
-            <p:style>
-              <a:lnRef idx="3">
-                <a:schemeClr val="dk1"/>
-              </a:lnRef>
-              <a:fillRef idx="0">
-                <a:schemeClr val="dk1"/>
-              </a:fillRef>
-              <a:effectRef idx="2">
-                <a:schemeClr val="dk1"/>
-              </a:effectRef>
-              <a:fontRef idx="minor">
+              </a:solidFill>
+            </a:ln>
+          </p:spPr>
+          <p:style>
+            <a:lnRef idx="2">
+              <a:schemeClr val="accent6"/>
+            </a:lnRef>
+            <a:fillRef idx="1">
+              <a:schemeClr val="lt1"/>
+            </a:fillRef>
+            <a:effectRef idx="0">
+              <a:schemeClr val="accent6"/>
+            </a:effectRef>
+            <a:fontRef idx="minor">
+              <a:schemeClr val="dk1"/>
+            </a:fontRef>
+          </p:style>
+          <p:txBody>
+            <a:bodyPr rtlCol="0" anchor="ctr"/>
+            <a:lstStyle/>
+            <a:p>
+              <a:pPr algn="ctr"/>
+              <a:r>
+                <a:rPr lang="en-US" dirty="0" smtClean="0"/>
+                <a:t>001</a:t>
+              </a:r>
+              <a:endParaRPr lang="en-US" dirty="0"/>
+            </a:p>
+          </p:txBody>
+        </p:sp>
+        <p:sp>
+          <p:nvSpPr>
+            <p:cNvPr id="6" name="Oval 5"/>
+            <p:cNvSpPr/>
+            <p:nvPr/>
+          </p:nvSpPr>
+          <p:spPr>
+            <a:xfrm>
+              <a:off x="8923587" y="1194949"/>
+              <a:ext cx="1604210" cy="1604210"/>
+            </a:xfrm>
+            <a:prstGeom prst="ellipse">
+              <a:avLst/>
+            </a:prstGeom>
+            <a:ln>
+              <a:solidFill>
                 <a:schemeClr val="tx1"/>
-              </a:fontRef>
-            </p:style>
-          </p:cxnSp>
-          <p:cxnSp>
-            <p:nvCxnSpPr>
-              <p:cNvPr id="19" name="Straight Arrow Connector 18"/>
-              <p:cNvCxnSpPr>
-                <a:stCxn id="7" idx="6"/>
-                <a:endCxn id="5" idx="2"/>
-              </p:cNvCxnSpPr>
-              <p:nvPr/>
-            </p:nvCxnSpPr>
-            <p:spPr>
-              <a:xfrm>
-                <a:off x="8022532" y="4764507"/>
-                <a:ext cx="912924" cy="0"/>
-              </a:xfrm>
-              <a:prstGeom prst="straightConnector1">
-                <a:avLst/>
-              </a:prstGeom>
-              <a:ln>
-                <a:tailEnd type="triangle"/>
-              </a:ln>
-            </p:spPr>
-            <p:style>
-              <a:lnRef idx="3">
-                <a:schemeClr val="dk1"/>
-              </a:lnRef>
-              <a:fillRef idx="0">
-                <a:schemeClr val="dk1"/>
-              </a:fillRef>
-              <a:effectRef idx="2">
-                <a:schemeClr val="dk1"/>
-              </a:effectRef>
-              <a:fontRef idx="minor">
+              </a:solidFill>
+            </a:ln>
+          </p:spPr>
+          <p:style>
+            <a:lnRef idx="2">
+              <a:schemeClr val="accent6"/>
+            </a:lnRef>
+            <a:fillRef idx="1">
+              <a:schemeClr val="lt1"/>
+            </a:fillRef>
+            <a:effectRef idx="0">
+              <a:schemeClr val="accent6"/>
+            </a:effectRef>
+            <a:fontRef idx="minor">
+              <a:schemeClr val="dk1"/>
+            </a:fontRef>
+          </p:style>
+          <p:txBody>
+            <a:bodyPr rtlCol="0" anchor="ctr"/>
+            <a:lstStyle/>
+            <a:p>
+              <a:pPr algn="ctr"/>
+              <a:r>
+                <a:rPr lang="en-US" dirty="0" smtClean="0"/>
+                <a:t>010</a:t>
+              </a:r>
+              <a:endParaRPr lang="en-US" dirty="0"/>
+            </a:p>
+          </p:txBody>
+        </p:sp>
+        <p:sp>
+          <p:nvSpPr>
+            <p:cNvPr id="7" name="Oval 6"/>
+            <p:cNvSpPr/>
+            <p:nvPr/>
+          </p:nvSpPr>
+          <p:spPr>
+            <a:xfrm>
+              <a:off x="6406453" y="4033900"/>
+              <a:ext cx="1604210" cy="1604210"/>
+            </a:xfrm>
+            <a:prstGeom prst="ellipse">
+              <a:avLst/>
+            </a:prstGeom>
+            <a:ln>
+              <a:solidFill>
                 <a:schemeClr val="tx1"/>
-              </a:fontRef>
-            </p:style>
-          </p:cxnSp>
-          <p:cxnSp>
-            <p:nvCxnSpPr>
-              <p:cNvPr id="23" name="Straight Arrow Connector 22"/>
-              <p:cNvCxnSpPr>
-                <a:stCxn id="8" idx="6"/>
-                <a:endCxn id="9" idx="2"/>
-              </p:cNvCxnSpPr>
-              <p:nvPr/>
-            </p:nvCxnSpPr>
-            <p:spPr>
-              <a:xfrm>
-                <a:off x="3216549" y="4764507"/>
-                <a:ext cx="684639" cy="0"/>
-              </a:xfrm>
-              <a:prstGeom prst="straightConnector1">
-                <a:avLst/>
-              </a:prstGeom>
-              <a:ln>
-                <a:tailEnd type="triangle"/>
-              </a:ln>
-            </p:spPr>
-            <p:style>
-              <a:lnRef idx="3">
-                <a:schemeClr val="dk1"/>
-              </a:lnRef>
-              <a:fillRef idx="0">
-                <a:schemeClr val="dk1"/>
-              </a:fillRef>
-              <a:effectRef idx="2">
-                <a:schemeClr val="dk1"/>
-              </a:effectRef>
-              <a:fontRef idx="minor">
+              </a:solidFill>
+            </a:ln>
+          </p:spPr>
+          <p:style>
+            <a:lnRef idx="2">
+              <a:schemeClr val="accent6"/>
+            </a:lnRef>
+            <a:fillRef idx="1">
+              <a:schemeClr val="lt1"/>
+            </a:fillRef>
+            <a:effectRef idx="0">
+              <a:schemeClr val="accent6"/>
+            </a:effectRef>
+            <a:fontRef idx="minor">
+              <a:schemeClr val="dk1"/>
+            </a:fontRef>
+          </p:style>
+          <p:txBody>
+            <a:bodyPr rtlCol="0" anchor="ctr"/>
+            <a:lstStyle/>
+            <a:p>
+              <a:pPr algn="ctr"/>
+              <a:r>
+                <a:rPr lang="en-US" dirty="0" smtClean="0"/>
+                <a:t>011</a:t>
+              </a:r>
+              <a:endParaRPr lang="en-US" dirty="0"/>
+            </a:p>
+          </p:txBody>
+        </p:sp>
+        <p:sp>
+          <p:nvSpPr>
+            <p:cNvPr id="8" name="Oval 7"/>
+            <p:cNvSpPr/>
+            <p:nvPr/>
+          </p:nvSpPr>
+          <p:spPr>
+            <a:xfrm>
+              <a:off x="1139024" y="4033900"/>
+              <a:ext cx="1604210" cy="1604210"/>
+            </a:xfrm>
+            <a:prstGeom prst="ellipse">
+              <a:avLst/>
+            </a:prstGeom>
+            <a:ln>
+              <a:solidFill>
                 <a:schemeClr val="tx1"/>
-              </a:fontRef>
-            </p:style>
-          </p:cxnSp>
-          <p:cxnSp>
-            <p:nvCxnSpPr>
-              <p:cNvPr id="25" name="Straight Arrow Connector 24"/>
-              <p:cNvCxnSpPr>
-                <a:endCxn id="7" idx="2"/>
-              </p:cNvCxnSpPr>
-              <p:nvPr/>
-            </p:nvCxnSpPr>
-            <p:spPr>
-              <a:xfrm>
-                <a:off x="5505398" y="4764506"/>
-                <a:ext cx="912924" cy="1"/>
-              </a:xfrm>
-              <a:prstGeom prst="straightConnector1">
-                <a:avLst/>
-              </a:prstGeom>
-              <a:ln>
-                <a:tailEnd type="triangle"/>
-              </a:ln>
-            </p:spPr>
-            <p:style>
-              <a:lnRef idx="3">
-                <a:schemeClr val="dk1"/>
-              </a:lnRef>
-              <a:fillRef idx="0">
-                <a:schemeClr val="dk1"/>
-              </a:fillRef>
-              <a:effectRef idx="2">
-                <a:schemeClr val="dk1"/>
-              </a:effectRef>
-              <a:fontRef idx="minor">
+              </a:solidFill>
+            </a:ln>
+          </p:spPr>
+          <p:style>
+            <a:lnRef idx="2">
+              <a:schemeClr val="accent6"/>
+            </a:lnRef>
+            <a:fillRef idx="1">
+              <a:schemeClr val="lt1"/>
+            </a:fillRef>
+            <a:effectRef idx="0">
+              <a:schemeClr val="accent6"/>
+            </a:effectRef>
+            <a:fontRef idx="minor">
+              <a:schemeClr val="dk1"/>
+            </a:fontRef>
+          </p:style>
+          <p:txBody>
+            <a:bodyPr rtlCol="0" anchor="ctr"/>
+            <a:lstStyle/>
+            <a:p>
+              <a:pPr algn="ctr"/>
+              <a:r>
+                <a:rPr lang="en-US" dirty="0"/>
+                <a:t>1</a:t>
+              </a:r>
+              <a:r>
+                <a:rPr lang="en-US" dirty="0" smtClean="0"/>
+                <a:t>00</a:t>
+              </a:r>
+              <a:endParaRPr lang="en-US" dirty="0"/>
+            </a:p>
+          </p:txBody>
+        </p:sp>
+        <p:sp>
+          <p:nvSpPr>
+            <p:cNvPr id="9" name="Oval 8"/>
+            <p:cNvSpPr/>
+            <p:nvPr/>
+          </p:nvSpPr>
+          <p:spPr>
+            <a:xfrm>
+              <a:off x="3889319" y="4033900"/>
+              <a:ext cx="1604210" cy="1604210"/>
+            </a:xfrm>
+            <a:prstGeom prst="ellipse">
+              <a:avLst/>
+            </a:prstGeom>
+            <a:ln>
+              <a:solidFill>
                 <a:schemeClr val="tx1"/>
-              </a:fontRef>
-            </p:style>
-          </p:cxnSp>
-          <p:cxnSp>
-            <p:nvCxnSpPr>
-              <p:cNvPr id="27" name="Straight Arrow Connector 26"/>
-              <p:cNvCxnSpPr>
-                <a:stCxn id="10" idx="2"/>
-                <a:endCxn id="11" idx="6"/>
-              </p:cNvCxnSpPr>
-              <p:nvPr/>
-            </p:nvCxnSpPr>
-            <p:spPr>
-              <a:xfrm flipH="1">
-                <a:off x="5384609" y="1925556"/>
-                <a:ext cx="916247" cy="0"/>
-              </a:xfrm>
-              <a:prstGeom prst="straightConnector1">
-                <a:avLst/>
-              </a:prstGeom>
-              <a:ln>
-                <a:tailEnd type="triangle"/>
-              </a:ln>
-            </p:spPr>
-            <p:style>
-              <a:lnRef idx="3">
-                <a:schemeClr val="dk1"/>
-              </a:lnRef>
-              <a:fillRef idx="0">
-                <a:schemeClr val="dk1"/>
-              </a:fillRef>
-              <a:effectRef idx="2">
-                <a:schemeClr val="dk1"/>
-              </a:effectRef>
-              <a:fontRef idx="minor">
+              </a:solidFill>
+            </a:ln>
+          </p:spPr>
+          <p:style>
+            <a:lnRef idx="2">
+              <a:schemeClr val="accent6"/>
+            </a:lnRef>
+            <a:fillRef idx="1">
+              <a:schemeClr val="lt1"/>
+            </a:fillRef>
+            <a:effectRef idx="0">
+              <a:schemeClr val="accent6"/>
+            </a:effectRef>
+            <a:fontRef idx="minor">
+              <a:schemeClr val="dk1"/>
+            </a:fontRef>
+          </p:style>
+          <p:txBody>
+            <a:bodyPr rtlCol="0" anchor="ctr"/>
+            <a:lstStyle/>
+            <a:p>
+              <a:pPr algn="ctr"/>
+              <a:r>
+                <a:rPr lang="en-US" dirty="0"/>
+                <a:t>1</a:t>
+              </a:r>
+              <a:r>
+                <a:rPr lang="en-US" dirty="0" smtClean="0"/>
+                <a:t>01</a:t>
+              </a:r>
+              <a:endParaRPr lang="en-US" dirty="0"/>
+            </a:p>
+          </p:txBody>
+        </p:sp>
+        <p:sp>
+          <p:nvSpPr>
+            <p:cNvPr id="10" name="Oval 9"/>
+            <p:cNvSpPr/>
+            <p:nvPr/>
+          </p:nvSpPr>
+          <p:spPr>
+            <a:xfrm>
+              <a:off x="6288987" y="1194949"/>
+              <a:ext cx="1604210" cy="1604210"/>
+            </a:xfrm>
+            <a:prstGeom prst="ellipse">
+              <a:avLst/>
+            </a:prstGeom>
+            <a:ln>
+              <a:solidFill>
                 <a:schemeClr val="tx1"/>
-              </a:fontRef>
-            </p:style>
-          </p:cxnSp>
-          <p:cxnSp>
-            <p:nvCxnSpPr>
-              <p:cNvPr id="29" name="Straight Arrow Connector 28"/>
-              <p:cNvCxnSpPr>
-                <a:stCxn id="11" idx="2"/>
-              </p:cNvCxnSpPr>
-              <p:nvPr/>
-            </p:nvCxnSpPr>
-            <p:spPr>
-              <a:xfrm flipH="1">
-                <a:off x="3214888" y="1925556"/>
-                <a:ext cx="565511" cy="0"/>
-              </a:xfrm>
-              <a:prstGeom prst="straightConnector1">
-                <a:avLst/>
-              </a:prstGeom>
-              <a:ln>
-                <a:tailEnd type="triangle"/>
-              </a:ln>
-            </p:spPr>
-            <p:style>
-              <a:lnRef idx="3">
-                <a:schemeClr val="dk1"/>
-              </a:lnRef>
-              <a:fillRef idx="0">
-                <a:schemeClr val="dk1"/>
-              </a:fillRef>
-              <a:effectRef idx="2">
-                <a:schemeClr val="dk1"/>
-              </a:effectRef>
-              <a:fontRef idx="minor">
+              </a:solidFill>
+            </a:ln>
+          </p:spPr>
+          <p:style>
+            <a:lnRef idx="2">
+              <a:schemeClr val="accent6"/>
+            </a:lnRef>
+            <a:fillRef idx="1">
+              <a:schemeClr val="lt1"/>
+            </a:fillRef>
+            <a:effectRef idx="0">
+              <a:schemeClr val="accent6"/>
+            </a:effectRef>
+            <a:fontRef idx="minor">
+              <a:schemeClr val="dk1"/>
+            </a:fontRef>
+          </p:style>
+          <p:txBody>
+            <a:bodyPr rtlCol="0" anchor="ctr"/>
+            <a:lstStyle/>
+            <a:p>
+              <a:pPr algn="ctr"/>
+              <a:r>
+                <a:rPr lang="en-US" dirty="0"/>
+                <a:t>1</a:t>
+              </a:r>
+              <a:r>
+                <a:rPr lang="en-US" dirty="0" smtClean="0"/>
+                <a:t>10</a:t>
+              </a:r>
+              <a:endParaRPr lang="en-US" dirty="0"/>
+            </a:p>
+          </p:txBody>
+        </p:sp>
+        <p:sp>
+          <p:nvSpPr>
+            <p:cNvPr id="11" name="Oval 10"/>
+            <p:cNvSpPr/>
+            <p:nvPr/>
+          </p:nvSpPr>
+          <p:spPr>
+            <a:xfrm>
+              <a:off x="3768530" y="1194949"/>
+              <a:ext cx="1604210" cy="1604210"/>
+            </a:xfrm>
+            <a:prstGeom prst="ellipse">
+              <a:avLst/>
+            </a:prstGeom>
+            <a:ln>
+              <a:solidFill>
                 <a:schemeClr val="tx1"/>
-              </a:fontRef>
-            </p:style>
-          </p:cxnSp>
-        </p:grpSp>
+              </a:solidFill>
+            </a:ln>
+          </p:spPr>
+          <p:style>
+            <a:lnRef idx="2">
+              <a:schemeClr val="accent6"/>
+            </a:lnRef>
+            <a:fillRef idx="1">
+              <a:schemeClr val="lt1"/>
+            </a:fillRef>
+            <a:effectRef idx="0">
+              <a:schemeClr val="accent6"/>
+            </a:effectRef>
+            <a:fontRef idx="minor">
+              <a:schemeClr val="dk1"/>
+            </a:fontRef>
+          </p:style>
+          <p:txBody>
+            <a:bodyPr rtlCol="0" anchor="ctr"/>
+            <a:lstStyle/>
+            <a:p>
+              <a:pPr algn="ctr"/>
+              <a:r>
+                <a:rPr lang="en-US" dirty="0"/>
+                <a:t>1</a:t>
+              </a:r>
+              <a:r>
+                <a:rPr lang="en-US" dirty="0" smtClean="0"/>
+                <a:t>11</a:t>
+              </a:r>
+              <a:endParaRPr lang="en-US" dirty="0"/>
+            </a:p>
+          </p:txBody>
+        </p:sp>
+        <p:cxnSp>
+          <p:nvCxnSpPr>
+            <p:cNvPr id="13" name="Straight Arrow Connector 12"/>
+            <p:cNvCxnSpPr>
+              <a:stCxn id="4" idx="4"/>
+              <a:endCxn id="8" idx="0"/>
+            </p:cNvCxnSpPr>
+            <p:nvPr/>
+          </p:nvCxnSpPr>
+          <p:spPr>
+            <a:xfrm>
+              <a:off x="1941129" y="2799159"/>
+              <a:ext cx="0" cy="1234741"/>
+            </a:xfrm>
+            <a:prstGeom prst="straightConnector1">
+              <a:avLst/>
+            </a:prstGeom>
+            <a:ln>
+              <a:tailEnd type="triangle"/>
+            </a:ln>
+          </p:spPr>
+          <p:style>
+            <a:lnRef idx="3">
+              <a:schemeClr val="dk1"/>
+            </a:lnRef>
+            <a:fillRef idx="0">
+              <a:schemeClr val="dk1"/>
+            </a:fillRef>
+            <a:effectRef idx="2">
+              <a:schemeClr val="dk1"/>
+            </a:effectRef>
+            <a:fontRef idx="minor">
+              <a:schemeClr val="tx1"/>
+            </a:fontRef>
+          </p:style>
+        </p:cxnSp>
+        <p:cxnSp>
+          <p:nvCxnSpPr>
+            <p:cNvPr id="15" name="Straight Arrow Connector 14"/>
+            <p:cNvCxnSpPr>
+              <a:stCxn id="5" idx="0"/>
+              <a:endCxn id="6" idx="4"/>
+            </p:cNvCxnSpPr>
+            <p:nvPr/>
+          </p:nvCxnSpPr>
+          <p:spPr>
+            <a:xfrm flipV="1">
+              <a:off x="9725692" y="2799159"/>
+              <a:ext cx="0" cy="1234741"/>
+            </a:xfrm>
+            <a:prstGeom prst="straightConnector1">
+              <a:avLst/>
+            </a:prstGeom>
+            <a:ln>
+              <a:tailEnd type="triangle"/>
+            </a:ln>
+          </p:spPr>
+          <p:style>
+            <a:lnRef idx="3">
+              <a:schemeClr val="dk1"/>
+            </a:lnRef>
+            <a:fillRef idx="0">
+              <a:schemeClr val="dk1"/>
+            </a:fillRef>
+            <a:effectRef idx="2">
+              <a:schemeClr val="dk1"/>
+            </a:effectRef>
+            <a:fontRef idx="minor">
+              <a:schemeClr val="tx1"/>
+            </a:fontRef>
+          </p:style>
+        </p:cxnSp>
+        <p:cxnSp>
+          <p:nvCxnSpPr>
+            <p:cNvPr id="17" name="Straight Arrow Connector 16"/>
+            <p:cNvCxnSpPr>
+              <a:stCxn id="6" idx="2"/>
+              <a:endCxn id="10" idx="6"/>
+            </p:cNvCxnSpPr>
+            <p:nvPr/>
+          </p:nvCxnSpPr>
+          <p:spPr>
+            <a:xfrm flipH="1">
+              <a:off x="7893197" y="1997054"/>
+              <a:ext cx="1030390" cy="0"/>
+            </a:xfrm>
+            <a:prstGeom prst="straightConnector1">
+              <a:avLst/>
+            </a:prstGeom>
+            <a:ln>
+              <a:tailEnd type="triangle"/>
+            </a:ln>
+          </p:spPr>
+          <p:style>
+            <a:lnRef idx="3">
+              <a:schemeClr val="dk1"/>
+            </a:lnRef>
+            <a:fillRef idx="0">
+              <a:schemeClr val="dk1"/>
+            </a:fillRef>
+            <a:effectRef idx="2">
+              <a:schemeClr val="dk1"/>
+            </a:effectRef>
+            <a:fontRef idx="minor">
+              <a:schemeClr val="tx1"/>
+            </a:fontRef>
+          </p:style>
+        </p:cxnSp>
+        <p:cxnSp>
+          <p:nvCxnSpPr>
+            <p:cNvPr id="19" name="Straight Arrow Connector 18"/>
+            <p:cNvCxnSpPr>
+              <a:stCxn id="7" idx="6"/>
+              <a:endCxn id="5" idx="2"/>
+            </p:cNvCxnSpPr>
+            <p:nvPr/>
+          </p:nvCxnSpPr>
+          <p:spPr>
+            <a:xfrm>
+              <a:off x="8010663" y="4836005"/>
+              <a:ext cx="912924" cy="0"/>
+            </a:xfrm>
+            <a:prstGeom prst="straightConnector1">
+              <a:avLst/>
+            </a:prstGeom>
+            <a:ln>
+              <a:tailEnd type="triangle"/>
+            </a:ln>
+          </p:spPr>
+          <p:style>
+            <a:lnRef idx="3">
+              <a:schemeClr val="dk1"/>
+            </a:lnRef>
+            <a:fillRef idx="0">
+              <a:schemeClr val="dk1"/>
+            </a:fillRef>
+            <a:effectRef idx="2">
+              <a:schemeClr val="dk1"/>
+            </a:effectRef>
+            <a:fontRef idx="minor">
+              <a:schemeClr val="tx1"/>
+            </a:fontRef>
+          </p:style>
+        </p:cxnSp>
+        <p:cxnSp>
+          <p:nvCxnSpPr>
+            <p:cNvPr id="23" name="Straight Arrow Connector 22"/>
+            <p:cNvCxnSpPr>
+              <a:stCxn id="8" idx="6"/>
+              <a:endCxn id="9" idx="2"/>
+            </p:cNvCxnSpPr>
+            <p:nvPr/>
+          </p:nvCxnSpPr>
+          <p:spPr>
+            <a:xfrm>
+              <a:off x="2743234" y="4836005"/>
+              <a:ext cx="1146085" cy="0"/>
+            </a:xfrm>
+            <a:prstGeom prst="straightConnector1">
+              <a:avLst/>
+            </a:prstGeom>
+            <a:ln>
+              <a:tailEnd type="triangle"/>
+            </a:ln>
+          </p:spPr>
+          <p:style>
+            <a:lnRef idx="3">
+              <a:schemeClr val="dk1"/>
+            </a:lnRef>
+            <a:fillRef idx="0">
+              <a:schemeClr val="dk1"/>
+            </a:fillRef>
+            <a:effectRef idx="2">
+              <a:schemeClr val="dk1"/>
+            </a:effectRef>
+            <a:fontRef idx="minor">
+              <a:schemeClr val="tx1"/>
+            </a:fontRef>
+          </p:style>
+        </p:cxnSp>
+        <p:cxnSp>
+          <p:nvCxnSpPr>
+            <p:cNvPr id="25" name="Straight Arrow Connector 24"/>
+            <p:cNvCxnSpPr>
+              <a:endCxn id="7" idx="2"/>
+            </p:cNvCxnSpPr>
+            <p:nvPr/>
+          </p:nvCxnSpPr>
+          <p:spPr>
+            <a:xfrm>
+              <a:off x="5493529" y="4836004"/>
+              <a:ext cx="912924" cy="1"/>
+            </a:xfrm>
+            <a:prstGeom prst="straightConnector1">
+              <a:avLst/>
+            </a:prstGeom>
+            <a:ln>
+              <a:tailEnd type="triangle"/>
+            </a:ln>
+          </p:spPr>
+          <p:style>
+            <a:lnRef idx="3">
+              <a:schemeClr val="dk1"/>
+            </a:lnRef>
+            <a:fillRef idx="0">
+              <a:schemeClr val="dk1"/>
+            </a:fillRef>
+            <a:effectRef idx="2">
+              <a:schemeClr val="dk1"/>
+            </a:effectRef>
+            <a:fontRef idx="minor">
+              <a:schemeClr val="tx1"/>
+            </a:fontRef>
+          </p:style>
+        </p:cxnSp>
+        <p:cxnSp>
+          <p:nvCxnSpPr>
+            <p:cNvPr id="27" name="Straight Arrow Connector 26"/>
+            <p:cNvCxnSpPr>
+              <a:stCxn id="10" idx="2"/>
+              <a:endCxn id="11" idx="6"/>
+            </p:cNvCxnSpPr>
+            <p:nvPr/>
+          </p:nvCxnSpPr>
+          <p:spPr>
+            <a:xfrm flipH="1">
+              <a:off x="5372740" y="1997054"/>
+              <a:ext cx="916247" cy="0"/>
+            </a:xfrm>
+            <a:prstGeom prst="straightConnector1">
+              <a:avLst/>
+            </a:prstGeom>
+            <a:ln>
+              <a:tailEnd type="triangle"/>
+            </a:ln>
+          </p:spPr>
+          <p:style>
+            <a:lnRef idx="3">
+              <a:schemeClr val="dk1"/>
+            </a:lnRef>
+            <a:fillRef idx="0">
+              <a:schemeClr val="dk1"/>
+            </a:fillRef>
+            <a:effectRef idx="2">
+              <a:schemeClr val="dk1"/>
+            </a:effectRef>
+            <a:fontRef idx="minor">
+              <a:schemeClr val="tx1"/>
+            </a:fontRef>
+          </p:style>
+        </p:cxnSp>
+        <p:cxnSp>
+          <p:nvCxnSpPr>
+            <p:cNvPr id="29" name="Straight Arrow Connector 28"/>
+            <p:cNvCxnSpPr>
+              <a:stCxn id="11" idx="2"/>
+              <a:endCxn id="4" idx="6"/>
+            </p:cNvCxnSpPr>
+            <p:nvPr/>
+          </p:nvCxnSpPr>
+          <p:spPr>
+            <a:xfrm flipH="1">
+              <a:off x="2743234" y="1997054"/>
+              <a:ext cx="1025296" cy="0"/>
+            </a:xfrm>
+            <a:prstGeom prst="straightConnector1">
+              <a:avLst/>
+            </a:prstGeom>
+            <a:ln>
+              <a:tailEnd type="triangle"/>
+            </a:ln>
+          </p:spPr>
+          <p:style>
+            <a:lnRef idx="3">
+              <a:schemeClr val="dk1"/>
+            </a:lnRef>
+            <a:fillRef idx="0">
+              <a:schemeClr val="dk1"/>
+            </a:fillRef>
+            <a:effectRef idx="2">
+              <a:schemeClr val="dk1"/>
+            </a:effectRef>
+            <a:fontRef idx="minor">
+              <a:schemeClr val="tx1"/>
+            </a:fontRef>
+          </p:style>
+        </p:cxnSp>
+        <p:sp>
+          <p:nvSpPr>
+            <p:cNvPr id="31" name="Arc 30"/>
+            <p:cNvSpPr/>
+            <p:nvPr/>
+          </p:nvSpPr>
+          <p:spPr>
+            <a:xfrm>
+              <a:off x="9833758" y="775156"/>
+              <a:ext cx="773084" cy="839586"/>
+            </a:xfrm>
+            <a:prstGeom prst="arc">
+              <a:avLst>
+                <a:gd name="adj1" fmla="val 10652949"/>
+                <a:gd name="adj2" fmla="val 3824854"/>
+              </a:avLst>
+            </a:prstGeom>
+            <a:ln>
+              <a:headEnd type="triangle" w="med" len="med"/>
+              <a:tailEnd type="none" w="med" len="med"/>
+            </a:ln>
+          </p:spPr>
+          <p:style>
+            <a:lnRef idx="3">
+              <a:schemeClr val="dk1"/>
+            </a:lnRef>
+            <a:fillRef idx="0">
+              <a:schemeClr val="dk1"/>
+            </a:fillRef>
+            <a:effectRef idx="2">
+              <a:schemeClr val="dk1"/>
+            </a:effectRef>
+            <a:fontRef idx="minor">
+              <a:schemeClr val="tx1"/>
+            </a:fontRef>
+          </p:style>
+          <p:txBody>
+            <a:bodyPr rtlCol="0" anchor="ctr"/>
+            <a:lstStyle/>
+            <a:p>
+              <a:pPr algn="ctr"/>
+              <a:endParaRPr lang="en-US"/>
+            </a:p>
+          </p:txBody>
+        </p:sp>
+        <p:sp>
+          <p:nvSpPr>
+            <p:cNvPr id="35" name="Arc 34"/>
+            <p:cNvSpPr/>
+            <p:nvPr/>
+          </p:nvSpPr>
+          <p:spPr>
+            <a:xfrm>
+              <a:off x="7208558" y="775156"/>
+              <a:ext cx="773084" cy="839586"/>
+            </a:xfrm>
+            <a:prstGeom prst="arc">
+              <a:avLst>
+                <a:gd name="adj1" fmla="val 10652949"/>
+                <a:gd name="adj2" fmla="val 3824854"/>
+              </a:avLst>
+            </a:prstGeom>
+            <a:ln>
+              <a:headEnd type="triangle" w="med" len="med"/>
+              <a:tailEnd type="none" w="med" len="med"/>
+            </a:ln>
+          </p:spPr>
+          <p:style>
+            <a:lnRef idx="3">
+              <a:schemeClr val="dk1"/>
+            </a:lnRef>
+            <a:fillRef idx="0">
+              <a:schemeClr val="dk1"/>
+            </a:fillRef>
+            <a:effectRef idx="2">
+              <a:schemeClr val="dk1"/>
+            </a:effectRef>
+            <a:fontRef idx="minor">
+              <a:schemeClr val="tx1"/>
+            </a:fontRef>
+          </p:style>
+          <p:txBody>
+            <a:bodyPr rtlCol="0" anchor="ctr"/>
+            <a:lstStyle/>
+            <a:p>
+              <a:pPr algn="ctr"/>
+              <a:endParaRPr lang="en-US"/>
+            </a:p>
+          </p:txBody>
+        </p:sp>
+        <p:sp>
+          <p:nvSpPr>
+            <p:cNvPr id="36" name="Arc 35"/>
+            <p:cNvSpPr/>
+            <p:nvPr/>
+          </p:nvSpPr>
+          <p:spPr>
+            <a:xfrm>
+              <a:off x="4670254" y="775156"/>
+              <a:ext cx="773084" cy="839586"/>
+            </a:xfrm>
+            <a:prstGeom prst="arc">
+              <a:avLst>
+                <a:gd name="adj1" fmla="val 10652949"/>
+                <a:gd name="adj2" fmla="val 3824854"/>
+              </a:avLst>
+            </a:prstGeom>
+            <a:ln>
+              <a:headEnd type="triangle" w="med" len="med"/>
+              <a:tailEnd type="none" w="med" len="med"/>
+            </a:ln>
+          </p:spPr>
+          <p:style>
+            <a:lnRef idx="3">
+              <a:schemeClr val="dk1"/>
+            </a:lnRef>
+            <a:fillRef idx="0">
+              <a:schemeClr val="dk1"/>
+            </a:fillRef>
+            <a:effectRef idx="2">
+              <a:schemeClr val="dk1"/>
+            </a:effectRef>
+            <a:fontRef idx="minor">
+              <a:schemeClr val="tx1"/>
+            </a:fontRef>
+          </p:style>
+          <p:txBody>
+            <a:bodyPr rtlCol="0" anchor="ctr"/>
+            <a:lstStyle/>
+            <a:p>
+              <a:pPr algn="ctr"/>
+              <a:endParaRPr lang="en-US"/>
+            </a:p>
+          </p:txBody>
+        </p:sp>
+        <p:sp>
+          <p:nvSpPr>
+            <p:cNvPr id="37" name="Arc 36"/>
+            <p:cNvSpPr/>
+            <p:nvPr/>
+          </p:nvSpPr>
+          <p:spPr>
+            <a:xfrm>
+              <a:off x="2045054" y="775156"/>
+              <a:ext cx="773084" cy="839586"/>
+            </a:xfrm>
+            <a:prstGeom prst="arc">
+              <a:avLst>
+                <a:gd name="adj1" fmla="val 10652949"/>
+                <a:gd name="adj2" fmla="val 3824854"/>
+              </a:avLst>
+            </a:prstGeom>
+            <a:ln>
+              <a:headEnd type="triangle" w="med" len="med"/>
+              <a:tailEnd type="none" w="med" len="med"/>
+            </a:ln>
+          </p:spPr>
+          <p:style>
+            <a:lnRef idx="3">
+              <a:schemeClr val="dk1"/>
+            </a:lnRef>
+            <a:fillRef idx="0">
+              <a:schemeClr val="dk1"/>
+            </a:fillRef>
+            <a:effectRef idx="2">
+              <a:schemeClr val="dk1"/>
+            </a:effectRef>
+            <a:fontRef idx="minor">
+              <a:schemeClr val="tx1"/>
+            </a:fontRef>
+          </p:style>
+          <p:txBody>
+            <a:bodyPr rtlCol="0" anchor="ctr"/>
+            <a:lstStyle/>
+            <a:p>
+              <a:pPr algn="ctr"/>
+              <a:endParaRPr lang="en-US"/>
+            </a:p>
+          </p:txBody>
+        </p:sp>
+        <p:sp>
+          <p:nvSpPr>
+            <p:cNvPr id="41" name="Arc 40"/>
+            <p:cNvSpPr/>
+            <p:nvPr/>
+          </p:nvSpPr>
+          <p:spPr>
+            <a:xfrm>
+              <a:off x="9800596" y="3595366"/>
+              <a:ext cx="773084" cy="839586"/>
+            </a:xfrm>
+            <a:prstGeom prst="arc">
+              <a:avLst>
+                <a:gd name="adj1" fmla="val 10652949"/>
+                <a:gd name="adj2" fmla="val 3824854"/>
+              </a:avLst>
+            </a:prstGeom>
+            <a:ln>
+              <a:headEnd type="triangle" w="med" len="med"/>
+              <a:tailEnd type="none" w="med" len="med"/>
+            </a:ln>
+          </p:spPr>
+          <p:style>
+            <a:lnRef idx="3">
+              <a:schemeClr val="dk1"/>
+            </a:lnRef>
+            <a:fillRef idx="0">
+              <a:schemeClr val="dk1"/>
+            </a:fillRef>
+            <a:effectRef idx="2">
+              <a:schemeClr val="dk1"/>
+            </a:effectRef>
+            <a:fontRef idx="minor">
+              <a:schemeClr val="tx1"/>
+            </a:fontRef>
+          </p:style>
+          <p:txBody>
+            <a:bodyPr rtlCol="0" anchor="ctr"/>
+            <a:lstStyle/>
+            <a:p>
+              <a:pPr algn="ctr"/>
+              <a:endParaRPr lang="en-US"/>
+            </a:p>
+          </p:txBody>
+        </p:sp>
+        <p:sp>
+          <p:nvSpPr>
+            <p:cNvPr id="42" name="Arc 41"/>
+            <p:cNvSpPr/>
+            <p:nvPr/>
+          </p:nvSpPr>
+          <p:spPr>
+            <a:xfrm>
+              <a:off x="7329018" y="3618335"/>
+              <a:ext cx="773084" cy="839586"/>
+            </a:xfrm>
+            <a:prstGeom prst="arc">
+              <a:avLst>
+                <a:gd name="adj1" fmla="val 10652949"/>
+                <a:gd name="adj2" fmla="val 3824854"/>
+              </a:avLst>
+            </a:prstGeom>
+            <a:ln>
+              <a:headEnd type="triangle" w="med" len="med"/>
+              <a:tailEnd type="none" w="med" len="med"/>
+            </a:ln>
+          </p:spPr>
+          <p:style>
+            <a:lnRef idx="3">
+              <a:schemeClr val="dk1"/>
+            </a:lnRef>
+            <a:fillRef idx="0">
+              <a:schemeClr val="dk1"/>
+            </a:fillRef>
+            <a:effectRef idx="2">
+              <a:schemeClr val="dk1"/>
+            </a:effectRef>
+            <a:fontRef idx="minor">
+              <a:schemeClr val="tx1"/>
+            </a:fontRef>
+          </p:style>
+          <p:txBody>
+            <a:bodyPr rtlCol="0" anchor="ctr"/>
+            <a:lstStyle/>
+            <a:p>
+              <a:pPr algn="ctr"/>
+              <a:endParaRPr lang="en-US"/>
+            </a:p>
+          </p:txBody>
+        </p:sp>
+        <p:sp>
+          <p:nvSpPr>
+            <p:cNvPr id="43" name="Arc 42"/>
+            <p:cNvSpPr/>
+            <p:nvPr/>
+          </p:nvSpPr>
+          <p:spPr>
+            <a:xfrm>
+              <a:off x="4807922" y="3618636"/>
+              <a:ext cx="773084" cy="839586"/>
+            </a:xfrm>
+            <a:prstGeom prst="arc">
+              <a:avLst>
+                <a:gd name="adj1" fmla="val 10652949"/>
+                <a:gd name="adj2" fmla="val 3824854"/>
+              </a:avLst>
+            </a:prstGeom>
+            <a:ln>
+              <a:headEnd type="triangle" w="med" len="med"/>
+              <a:tailEnd type="none" w="med" len="med"/>
+            </a:ln>
+          </p:spPr>
+          <p:style>
+            <a:lnRef idx="3">
+              <a:schemeClr val="dk1"/>
+            </a:lnRef>
+            <a:fillRef idx="0">
+              <a:schemeClr val="dk1"/>
+            </a:fillRef>
+            <a:effectRef idx="2">
+              <a:schemeClr val="dk1"/>
+            </a:effectRef>
+            <a:fontRef idx="minor">
+              <a:schemeClr val="tx1"/>
+            </a:fontRef>
+          </p:style>
+          <p:txBody>
+            <a:bodyPr rtlCol="0" anchor="ctr"/>
+            <a:lstStyle/>
+            <a:p>
+              <a:pPr algn="ctr"/>
+              <a:endParaRPr lang="en-US"/>
+            </a:p>
+          </p:txBody>
+        </p:sp>
+        <p:sp>
+          <p:nvSpPr>
+            <p:cNvPr id="44" name="Arc 43"/>
+            <p:cNvSpPr/>
+            <p:nvPr/>
+          </p:nvSpPr>
+          <p:spPr>
+            <a:xfrm>
+              <a:off x="2045054" y="3626949"/>
+              <a:ext cx="773084" cy="839586"/>
+            </a:xfrm>
+            <a:prstGeom prst="arc">
+              <a:avLst>
+                <a:gd name="adj1" fmla="val 10652949"/>
+                <a:gd name="adj2" fmla="val 3824854"/>
+              </a:avLst>
+            </a:prstGeom>
+            <a:ln>
+              <a:headEnd type="triangle" w="med" len="med"/>
+              <a:tailEnd type="none" w="med" len="med"/>
+            </a:ln>
+          </p:spPr>
+          <p:style>
+            <a:lnRef idx="3">
+              <a:schemeClr val="dk1"/>
+            </a:lnRef>
+            <a:fillRef idx="0">
+              <a:schemeClr val="dk1"/>
+            </a:fillRef>
+            <a:effectRef idx="2">
+              <a:schemeClr val="dk1"/>
+            </a:effectRef>
+            <a:fontRef idx="minor">
+              <a:schemeClr val="tx1"/>
+            </a:fontRef>
+          </p:style>
+          <p:txBody>
+            <a:bodyPr rtlCol="0" anchor="ctr"/>
+            <a:lstStyle/>
+            <a:p>
+              <a:pPr algn="ctr"/>
+              <a:endParaRPr lang="en-US"/>
+            </a:p>
+          </p:txBody>
+        </p:sp>
+        <p:sp>
+          <p:nvSpPr>
+            <p:cNvPr id="45" name="TextBox 44"/>
+            <p:cNvSpPr txBox="1"/>
+            <p:nvPr/>
+          </p:nvSpPr>
+          <p:spPr>
+            <a:xfrm>
+              <a:off x="2497752" y="563869"/>
+              <a:ext cx="396262" cy="261610"/>
+            </a:xfrm>
+            <a:prstGeom prst="rect">
+              <a:avLst/>
+            </a:prstGeom>
+            <a:noFill/>
+          </p:spPr>
+          <p:txBody>
+            <a:bodyPr wrap="none" rtlCol="0">
+              <a:spAutoFit/>
+            </a:bodyPr>
+            <a:lstStyle/>
+            <a:p>
+              <a:r>
+                <a:rPr lang="en-US" sz="1100" dirty="0" smtClean="0"/>
+                <a:t>T=0</a:t>
+              </a:r>
+              <a:endParaRPr lang="en-US" sz="1100" dirty="0"/>
+            </a:p>
+          </p:txBody>
+        </p:sp>
+        <p:sp>
+          <p:nvSpPr>
+            <p:cNvPr id="49" name="TextBox 48"/>
+            <p:cNvSpPr txBox="1"/>
+            <p:nvPr/>
+          </p:nvSpPr>
+          <p:spPr>
+            <a:xfrm>
+              <a:off x="5319917" y="563869"/>
+              <a:ext cx="396262" cy="261610"/>
+            </a:xfrm>
+            <a:prstGeom prst="rect">
+              <a:avLst/>
+            </a:prstGeom>
+            <a:noFill/>
+          </p:spPr>
+          <p:txBody>
+            <a:bodyPr wrap="none" rtlCol="0">
+              <a:spAutoFit/>
+            </a:bodyPr>
+            <a:lstStyle/>
+            <a:p>
+              <a:r>
+                <a:rPr lang="en-US" sz="1100" dirty="0" smtClean="0"/>
+                <a:t>T=0</a:t>
+              </a:r>
+              <a:endParaRPr lang="en-US" sz="1100" dirty="0"/>
+            </a:p>
+          </p:txBody>
+        </p:sp>
+        <p:sp>
+          <p:nvSpPr>
+            <p:cNvPr id="50" name="TextBox 49"/>
+            <p:cNvSpPr txBox="1"/>
+            <p:nvPr/>
+          </p:nvSpPr>
+          <p:spPr>
+            <a:xfrm>
+              <a:off x="7859980" y="563869"/>
+              <a:ext cx="396262" cy="261610"/>
+            </a:xfrm>
+            <a:prstGeom prst="rect">
+              <a:avLst/>
+            </a:prstGeom>
+            <a:noFill/>
+          </p:spPr>
+          <p:txBody>
+            <a:bodyPr wrap="none" rtlCol="0">
+              <a:spAutoFit/>
+            </a:bodyPr>
+            <a:lstStyle/>
+            <a:p>
+              <a:r>
+                <a:rPr lang="en-US" sz="1100" dirty="0" smtClean="0"/>
+                <a:t>T=0</a:t>
+              </a:r>
+              <a:endParaRPr lang="en-US" sz="1100" dirty="0"/>
+            </a:p>
+          </p:txBody>
+        </p:sp>
+        <p:sp>
+          <p:nvSpPr>
+            <p:cNvPr id="51" name="TextBox 50"/>
+            <p:cNvSpPr txBox="1"/>
+            <p:nvPr/>
+          </p:nvSpPr>
+          <p:spPr>
+            <a:xfrm>
+              <a:off x="10408711" y="583267"/>
+              <a:ext cx="396262" cy="261610"/>
+            </a:xfrm>
+            <a:prstGeom prst="rect">
+              <a:avLst/>
+            </a:prstGeom>
+            <a:noFill/>
+          </p:spPr>
+          <p:txBody>
+            <a:bodyPr wrap="none" rtlCol="0">
+              <a:spAutoFit/>
+            </a:bodyPr>
+            <a:lstStyle/>
+            <a:p>
+              <a:r>
+                <a:rPr lang="en-US" sz="1100" dirty="0" smtClean="0"/>
+                <a:t>T=0</a:t>
+              </a:r>
+              <a:endParaRPr lang="en-US" sz="1100" dirty="0"/>
+            </a:p>
+          </p:txBody>
+        </p:sp>
+        <p:sp>
+          <p:nvSpPr>
+            <p:cNvPr id="52" name="TextBox 51"/>
+            <p:cNvSpPr txBox="1"/>
+            <p:nvPr/>
+          </p:nvSpPr>
+          <p:spPr>
+            <a:xfrm>
+              <a:off x="2695883" y="3478994"/>
+              <a:ext cx="396262" cy="261610"/>
+            </a:xfrm>
+            <a:prstGeom prst="rect">
+              <a:avLst/>
+            </a:prstGeom>
+            <a:noFill/>
+          </p:spPr>
+          <p:txBody>
+            <a:bodyPr wrap="none" rtlCol="0">
+              <a:spAutoFit/>
+            </a:bodyPr>
+            <a:lstStyle/>
+            <a:p>
+              <a:r>
+                <a:rPr lang="en-US" sz="1100" dirty="0" smtClean="0"/>
+                <a:t>T=0</a:t>
+              </a:r>
+              <a:endParaRPr lang="en-US" sz="1100" dirty="0"/>
+            </a:p>
+          </p:txBody>
+        </p:sp>
+        <p:sp>
+          <p:nvSpPr>
+            <p:cNvPr id="53" name="TextBox 52"/>
+            <p:cNvSpPr txBox="1"/>
+            <p:nvPr/>
+          </p:nvSpPr>
+          <p:spPr>
+            <a:xfrm>
+              <a:off x="5518048" y="3478994"/>
+              <a:ext cx="396262" cy="261610"/>
+            </a:xfrm>
+            <a:prstGeom prst="rect">
+              <a:avLst/>
+            </a:prstGeom>
+            <a:noFill/>
+          </p:spPr>
+          <p:txBody>
+            <a:bodyPr wrap="none" rtlCol="0">
+              <a:spAutoFit/>
+            </a:bodyPr>
+            <a:lstStyle/>
+            <a:p>
+              <a:r>
+                <a:rPr lang="en-US" sz="1100" dirty="0" smtClean="0"/>
+                <a:t>T=0</a:t>
+              </a:r>
+              <a:endParaRPr lang="en-US" sz="1100" dirty="0"/>
+            </a:p>
+          </p:txBody>
+        </p:sp>
+        <p:sp>
+          <p:nvSpPr>
+            <p:cNvPr id="54" name="TextBox 53"/>
+            <p:cNvSpPr txBox="1"/>
+            <p:nvPr/>
+          </p:nvSpPr>
+          <p:spPr>
+            <a:xfrm>
+              <a:off x="8058111" y="3478994"/>
+              <a:ext cx="396262" cy="261610"/>
+            </a:xfrm>
+            <a:prstGeom prst="rect">
+              <a:avLst/>
+            </a:prstGeom>
+            <a:noFill/>
+          </p:spPr>
+          <p:txBody>
+            <a:bodyPr wrap="none" rtlCol="0">
+              <a:spAutoFit/>
+            </a:bodyPr>
+            <a:lstStyle/>
+            <a:p>
+              <a:r>
+                <a:rPr lang="en-US" sz="1100" dirty="0" smtClean="0"/>
+                <a:t>T=0</a:t>
+              </a:r>
+              <a:endParaRPr lang="en-US" sz="1100" dirty="0"/>
+            </a:p>
+          </p:txBody>
+        </p:sp>
+        <p:sp>
+          <p:nvSpPr>
+            <p:cNvPr id="55" name="TextBox 54"/>
+            <p:cNvSpPr txBox="1"/>
+            <p:nvPr/>
+          </p:nvSpPr>
+          <p:spPr>
+            <a:xfrm>
+              <a:off x="10527797" y="3487530"/>
+              <a:ext cx="396262" cy="261610"/>
+            </a:xfrm>
+            <a:prstGeom prst="rect">
+              <a:avLst/>
+            </a:prstGeom>
+            <a:noFill/>
+          </p:spPr>
+          <p:txBody>
+            <a:bodyPr wrap="none" rtlCol="0">
+              <a:spAutoFit/>
+            </a:bodyPr>
+            <a:lstStyle/>
+            <a:p>
+              <a:r>
+                <a:rPr lang="en-US" sz="1100" dirty="0" smtClean="0"/>
+                <a:t>T=0</a:t>
+              </a:r>
+              <a:endParaRPr lang="en-US" sz="1100" dirty="0"/>
+            </a:p>
+          </p:txBody>
+        </p:sp>
+        <p:sp>
+          <p:nvSpPr>
+            <p:cNvPr id="56" name="TextBox 55"/>
+            <p:cNvSpPr txBox="1"/>
+            <p:nvPr/>
+          </p:nvSpPr>
+          <p:spPr>
+            <a:xfrm>
+              <a:off x="3031344" y="1675093"/>
+              <a:ext cx="396262" cy="261610"/>
+            </a:xfrm>
+            <a:prstGeom prst="rect">
+              <a:avLst/>
+            </a:prstGeom>
+            <a:noFill/>
+          </p:spPr>
+          <p:txBody>
+            <a:bodyPr wrap="none" rtlCol="0">
+              <a:spAutoFit/>
+            </a:bodyPr>
+            <a:lstStyle/>
+            <a:p>
+              <a:r>
+                <a:rPr lang="en-US" sz="1100" dirty="0" smtClean="0"/>
+                <a:t>T=1</a:t>
+              </a:r>
+              <a:endParaRPr lang="en-US" sz="1100" dirty="0"/>
+            </a:p>
+          </p:txBody>
+        </p:sp>
+        <p:sp>
+          <p:nvSpPr>
+            <p:cNvPr id="57" name="TextBox 56"/>
+            <p:cNvSpPr txBox="1"/>
+            <p:nvPr/>
+          </p:nvSpPr>
+          <p:spPr>
+            <a:xfrm>
+              <a:off x="5689804" y="1665161"/>
+              <a:ext cx="396262" cy="261610"/>
+            </a:xfrm>
+            <a:prstGeom prst="rect">
+              <a:avLst/>
+            </a:prstGeom>
+            <a:noFill/>
+          </p:spPr>
+          <p:txBody>
+            <a:bodyPr wrap="none" rtlCol="0">
+              <a:spAutoFit/>
+            </a:bodyPr>
+            <a:lstStyle/>
+            <a:p>
+              <a:r>
+                <a:rPr lang="en-US" sz="1100" dirty="0" smtClean="0"/>
+                <a:t>T=1</a:t>
+              </a:r>
+              <a:endParaRPr lang="en-US" sz="1100" dirty="0"/>
+            </a:p>
+          </p:txBody>
+        </p:sp>
+        <p:sp>
+          <p:nvSpPr>
+            <p:cNvPr id="59" name="TextBox 58"/>
+            <p:cNvSpPr txBox="1"/>
+            <p:nvPr/>
+          </p:nvSpPr>
+          <p:spPr>
+            <a:xfrm>
+              <a:off x="8256242" y="1672241"/>
+              <a:ext cx="396262" cy="261610"/>
+            </a:xfrm>
+            <a:prstGeom prst="rect">
+              <a:avLst/>
+            </a:prstGeom>
+            <a:noFill/>
+          </p:spPr>
+          <p:txBody>
+            <a:bodyPr wrap="none" rtlCol="0">
+              <a:spAutoFit/>
+            </a:bodyPr>
+            <a:lstStyle/>
+            <a:p>
+              <a:r>
+                <a:rPr lang="en-US" sz="1100" dirty="0" smtClean="0"/>
+                <a:t>T=1</a:t>
+              </a:r>
+              <a:endParaRPr lang="en-US" sz="1100" dirty="0"/>
+            </a:p>
+          </p:txBody>
+        </p:sp>
+        <p:sp>
+          <p:nvSpPr>
+            <p:cNvPr id="60" name="TextBox 59"/>
+            <p:cNvSpPr txBox="1"/>
+            <p:nvPr/>
+          </p:nvSpPr>
+          <p:spPr>
+            <a:xfrm>
+              <a:off x="3031344" y="4577246"/>
+              <a:ext cx="396262" cy="261610"/>
+            </a:xfrm>
+            <a:prstGeom prst="rect">
+              <a:avLst/>
+            </a:prstGeom>
+            <a:noFill/>
+          </p:spPr>
+          <p:txBody>
+            <a:bodyPr wrap="none" rtlCol="0">
+              <a:spAutoFit/>
+            </a:bodyPr>
+            <a:lstStyle/>
+            <a:p>
+              <a:r>
+                <a:rPr lang="en-US" sz="1100" dirty="0" smtClean="0"/>
+                <a:t>T=1</a:t>
+              </a:r>
+              <a:endParaRPr lang="en-US" sz="1100" dirty="0"/>
+            </a:p>
+          </p:txBody>
+        </p:sp>
+        <p:sp>
+          <p:nvSpPr>
+            <p:cNvPr id="61" name="TextBox 60"/>
+            <p:cNvSpPr txBox="1"/>
+            <p:nvPr/>
+          </p:nvSpPr>
+          <p:spPr>
+            <a:xfrm>
+              <a:off x="5689804" y="4567314"/>
+              <a:ext cx="396262" cy="261610"/>
+            </a:xfrm>
+            <a:prstGeom prst="rect">
+              <a:avLst/>
+            </a:prstGeom>
+            <a:noFill/>
+          </p:spPr>
+          <p:txBody>
+            <a:bodyPr wrap="none" rtlCol="0">
+              <a:spAutoFit/>
+            </a:bodyPr>
+            <a:lstStyle/>
+            <a:p>
+              <a:r>
+                <a:rPr lang="en-US" sz="1100" dirty="0" smtClean="0"/>
+                <a:t>T=1</a:t>
+              </a:r>
+              <a:endParaRPr lang="en-US" sz="1100" dirty="0"/>
+            </a:p>
+          </p:txBody>
+        </p:sp>
+        <p:sp>
+          <p:nvSpPr>
+            <p:cNvPr id="62" name="TextBox 61"/>
+            <p:cNvSpPr txBox="1"/>
+            <p:nvPr/>
+          </p:nvSpPr>
+          <p:spPr>
+            <a:xfrm>
+              <a:off x="8256242" y="4574394"/>
+              <a:ext cx="396262" cy="261610"/>
+            </a:xfrm>
+            <a:prstGeom prst="rect">
+              <a:avLst/>
+            </a:prstGeom>
+            <a:noFill/>
+          </p:spPr>
+          <p:txBody>
+            <a:bodyPr wrap="none" rtlCol="0">
+              <a:spAutoFit/>
+            </a:bodyPr>
+            <a:lstStyle/>
+            <a:p>
+              <a:r>
+                <a:rPr lang="en-US" sz="1100" dirty="0" smtClean="0"/>
+                <a:t>T=1</a:t>
+              </a:r>
+              <a:endParaRPr lang="en-US" sz="1100" dirty="0"/>
+            </a:p>
+          </p:txBody>
+        </p:sp>
       </p:grpSp>
     </p:spTree>
     <p:extLst>

</xml_diff>